<commit_message>
Solve Recursion2 Divide and Conquer Problems from LeetCode
Signed-off-by: kumuda <kumudapriya.sanka@gmail.com>
</commit_message>
<xml_diff>
--- a/Recursion.pptx
+++ b/Recursion.pptx
@@ -22,14 +22,15 @@
     <p:sldId id="278" r:id="rId19"/>
     <p:sldId id="279" r:id="rId20"/>
     <p:sldId id="280" r:id="rId21"/>
-    <p:sldId id="283" r:id="rId22"/>
-    <p:sldId id="282" r:id="rId23"/>
-    <p:sldId id="284" r:id="rId24"/>
-    <p:sldId id="285" r:id="rId25"/>
-    <p:sldId id="286" r:id="rId26"/>
-    <p:sldId id="287" r:id="rId27"/>
-    <p:sldId id="288" r:id="rId28"/>
-    <p:sldId id="281" r:id="rId29"/>
+    <p:sldId id="290" r:id="rId22"/>
+    <p:sldId id="283" r:id="rId23"/>
+    <p:sldId id="282" r:id="rId24"/>
+    <p:sldId id="284" r:id="rId25"/>
+    <p:sldId id="285" r:id="rId26"/>
+    <p:sldId id="286" r:id="rId27"/>
+    <p:sldId id="287" r:id="rId28"/>
+    <p:sldId id="288" r:id="rId29"/>
+    <p:sldId id="281" r:id="rId30"/>
   </p:sldIdLst>
   <p:sldSz cx="12192000" cy="6858000"/>
   <p:notesSz cx="6858000" cy="9144000"/>
@@ -134,6 +135,73 @@
     </p:ext>
   </p:extLst>
 </p:presentation>
+</file>
+
+<file path=ppt/changesInfos/changesInfo1.xml><?xml version="1.0" encoding="utf-8"?>
+<pc:chgInfo xmlns:a="http://schemas.openxmlformats.org/drawingml/2006/main" xmlns:r="http://schemas.openxmlformats.org/officeDocument/2006/relationships" xmlns:ac="http://schemas.microsoft.com/office/drawing/2013/main/command" xmlns:pc="http://schemas.microsoft.com/office/powerpoint/2013/main/command">
+  <pc:docChgLst>
+    <pc:chgData name="kumuda sanka" userId="502332cbc185c6bc" providerId="LiveId" clId="{2EDBD6C1-4123-4E26-8579-D86120DF46CC}"/>
+    <pc:docChg chg="custSel addSld delSld modSld">
+      <pc:chgData name="kumuda sanka" userId="502332cbc185c6bc" providerId="LiveId" clId="{2EDBD6C1-4123-4E26-8579-D86120DF46CC}" dt="2022-09-06T18:12:36.337" v="278" actId="1076"/>
+      <pc:docMkLst>
+        <pc:docMk/>
+      </pc:docMkLst>
+      <pc:sldChg chg="modSp mod">
+        <pc:chgData name="kumuda sanka" userId="502332cbc185c6bc" providerId="LiveId" clId="{2EDBD6C1-4123-4E26-8579-D86120DF46CC}" dt="2022-09-06T15:05:38.514" v="249" actId="113"/>
+        <pc:sldMkLst>
+          <pc:docMk/>
+          <pc:sldMk cId="389739808" sldId="273"/>
+        </pc:sldMkLst>
+        <pc:spChg chg="mod">
+          <ac:chgData name="kumuda sanka" userId="502332cbc185c6bc" providerId="LiveId" clId="{2EDBD6C1-4123-4E26-8579-D86120DF46CC}" dt="2022-09-06T15:05:38.514" v="249" actId="113"/>
+          <ac:spMkLst>
+            <pc:docMk/>
+            <pc:sldMk cId="389739808" sldId="273"/>
+            <ac:spMk id="8" creationId="{30B05F9E-7BB5-4D38-B2E6-7F0C1A997469}"/>
+          </ac:spMkLst>
+        </pc:spChg>
+      </pc:sldChg>
+      <pc:sldChg chg="new del">
+        <pc:chgData name="kumuda sanka" userId="502332cbc185c6bc" providerId="LiveId" clId="{2EDBD6C1-4123-4E26-8579-D86120DF46CC}" dt="2022-09-06T18:11:34.841" v="252" actId="2696"/>
+        <pc:sldMkLst>
+          <pc:docMk/>
+          <pc:sldMk cId="1449089172" sldId="289"/>
+        </pc:sldMkLst>
+      </pc:sldChg>
+      <pc:sldChg chg="addSp delSp modSp add mod">
+        <pc:chgData name="kumuda sanka" userId="502332cbc185c6bc" providerId="LiveId" clId="{2EDBD6C1-4123-4E26-8579-D86120DF46CC}" dt="2022-09-06T18:12:36.337" v="278" actId="1076"/>
+        <pc:sldMkLst>
+          <pc:docMk/>
+          <pc:sldMk cId="1522715166" sldId="290"/>
+        </pc:sldMkLst>
+        <pc:spChg chg="mod">
+          <ac:chgData name="kumuda sanka" userId="502332cbc185c6bc" providerId="LiveId" clId="{2EDBD6C1-4123-4E26-8579-D86120DF46CC}" dt="2022-09-06T18:11:56.405" v="274"/>
+          <ac:spMkLst>
+            <pc:docMk/>
+            <pc:sldMk cId="1522715166" sldId="290"/>
+            <ac:spMk id="2" creationId="{92C9295F-E638-4F61-AFE2-CF3E40556031}"/>
+          </ac:spMkLst>
+        </pc:spChg>
+        <pc:picChg chg="add mod">
+          <ac:chgData name="kumuda sanka" userId="502332cbc185c6bc" providerId="LiveId" clId="{2EDBD6C1-4123-4E26-8579-D86120DF46CC}" dt="2022-09-06T18:12:36.337" v="278" actId="1076"/>
+          <ac:picMkLst>
+            <pc:docMk/>
+            <pc:sldMk cId="1522715166" sldId="290"/>
+            <ac:picMk id="5" creationId="{0E7AB9F1-B8EC-7A42-AD14-9379B7F8CD32}"/>
+          </ac:picMkLst>
+        </pc:picChg>
+        <pc:picChg chg="del">
+          <ac:chgData name="kumuda sanka" userId="502332cbc185c6bc" providerId="LiveId" clId="{2EDBD6C1-4123-4E26-8579-D86120DF46CC}" dt="2022-09-06T18:12:00.215" v="275" actId="478"/>
+          <ac:picMkLst>
+            <pc:docMk/>
+            <pc:sldMk cId="1522715166" sldId="290"/>
+            <ac:picMk id="6" creationId="{65154FF4-538C-44C6-A3FB-1DCFF5DA5095}"/>
+          </ac:picMkLst>
+        </pc:picChg>
+      </pc:sldChg>
+    </pc:docChg>
+  </pc:docChgLst>
+</pc:chgInfo>
 </file>
 
 <file path=ppt/slideLayouts/slideLayout1.xml><?xml version="1.0" encoding="utf-8"?>
@@ -605,7 +673,7 @@
           <a:p>
             <a:fld id="{EA0C0817-A112-4847-8014-A94B7D2A4EA3}" type="datetime1">
               <a:rPr lang="en-US" smtClean="0"/>
-              <a:t>9/25/2021</a:t>
+              <a:t>9/6/2022</a:t>
             </a:fld>
             <a:endParaRPr lang="en-US" dirty="0"/>
           </a:p>
@@ -807,7 +875,7 @@
           <a:p>
             <a:fld id="{134F40B7-36AB-4376-BE14-EF7004D79BB9}" type="datetime1">
               <a:rPr lang="en-US" smtClean="0"/>
-              <a:t>9/25/2021</a:t>
+              <a:t>9/6/2022</a:t>
             </a:fld>
             <a:endParaRPr lang="en-US" dirty="0"/>
           </a:p>
@@ -987,7 +1055,7 @@
           <a:p>
             <a:fld id="{FF87CAB8-DCAE-46A5-AADA-B3FAD11A54E0}" type="datetime1">
               <a:rPr lang="en-US" smtClean="0"/>
-              <a:t>9/25/2021</a:t>
+              <a:t>9/6/2022</a:t>
             </a:fld>
             <a:endParaRPr lang="en-US" dirty="0"/>
           </a:p>
@@ -1157,7 +1225,7 @@
           <a:p>
             <a:fld id="{7332B432-ACDA-4023-A761-2BAB76577B62}" type="datetime1">
               <a:rPr lang="en-US" smtClean="0"/>
-              <a:t>9/25/2021</a:t>
+              <a:t>9/6/2022</a:t>
             </a:fld>
             <a:endParaRPr lang="en-US" dirty="0"/>
           </a:p>
@@ -1756,7 +1824,7 @@
           <a:p>
             <a:fld id="{D9C646AA-F36E-4540-911D-FFFC0A0EF24A}" type="datetime1">
               <a:rPr lang="en-US" smtClean="0"/>
-              <a:t>9/25/2021</a:t>
+              <a:t>9/6/2022</a:t>
             </a:fld>
             <a:endParaRPr lang="en-US" dirty="0"/>
           </a:p>
@@ -2076,7 +2144,7 @@
           <a:p>
             <a:fld id="{69186D26-FA5F-4637-B602-B7C2DC34CFD4}" type="datetime1">
               <a:rPr lang="en-US" smtClean="0"/>
-              <a:t>9/25/2021</a:t>
+              <a:t>9/6/2022</a:t>
             </a:fld>
             <a:endParaRPr lang="en-US" dirty="0"/>
           </a:p>
@@ -2513,7 +2581,7 @@
           <a:p>
             <a:fld id="{8A7F15D8-96D1-4781-BC50-CA8A088B2FE4}" type="datetime1">
               <a:rPr lang="en-US" smtClean="0"/>
-              <a:t>9/25/2021</a:t>
+              <a:t>9/6/2022</a:t>
             </a:fld>
             <a:endParaRPr lang="en-US" dirty="0"/>
           </a:p>
@@ -2631,7 +2699,7 @@
           <a:p>
             <a:fld id="{F9A96C99-B8F8-4528-BD05-0E16E943DC09}" type="datetime1">
               <a:rPr lang="en-US" smtClean="0"/>
-              <a:t>9/25/2021</a:t>
+              <a:t>9/6/2022</a:t>
             </a:fld>
             <a:endParaRPr lang="en-US" dirty="0"/>
           </a:p>
@@ -2726,7 +2794,7 @@
           <a:p>
             <a:fld id="{03636942-C211-4B28-8DBD-C953E00AF71B}" type="datetime1">
               <a:rPr lang="en-US" smtClean="0"/>
-              <a:t>9/25/2021</a:t>
+              <a:t>9/6/2022</a:t>
             </a:fld>
             <a:endParaRPr lang="en-US" dirty="0"/>
           </a:p>
@@ -3143,7 +3211,7 @@
           <a:p>
             <a:fld id="{7E8D12A6-918A-48BD-8CB9-CA713993B0EA}" type="datetime1">
               <a:rPr lang="en-US" smtClean="0"/>
-              <a:t>9/25/2021</a:t>
+              <a:t>9/6/2022</a:t>
             </a:fld>
             <a:endParaRPr lang="en-US" dirty="0"/>
           </a:p>
@@ -3405,7 +3473,7 @@
             <a:fld id="{E778CE86-875F-4587-BCF6-FA054AFC0D53}" type="datetime1">
               <a:rPr lang="en-US" smtClean="0"/>
               <a:pPr/>
-              <a:t>9/25/2021</a:t>
+              <a:t>9/6/2022</a:t>
             </a:fld>
             <a:endParaRPr lang="en-US" dirty="0"/>
           </a:p>
@@ -3921,7 +3989,7 @@
           <a:p>
             <a:fld id="{F6FA2B21-3FCD-4721-B95C-427943F61125}" type="datetime1">
               <a:rPr lang="en-US" smtClean="0"/>
-              <a:t>9/25/2021</a:t>
+              <a:t>9/6/2022</a:t>
             </a:fld>
             <a:endParaRPr lang="en-US" dirty="0"/>
           </a:p>
@@ -5122,7 +5190,7 @@
         <p:spPr>
           <a:xfrm>
             <a:off x="4680857" y="1878764"/>
-            <a:ext cx="6096000" cy="923330"/>
+            <a:ext cx="6096000" cy="2862322"/>
           </a:xfrm>
           <a:prstGeom prst="rect">
             <a:avLst/>
@@ -5136,16 +5204,39 @@
           <a:lstStyle/>
           <a:p>
             <a:r>
-              <a:rPr lang="en-US" sz="1800" dirty="0" err="1"/>
+              <a:rPr lang="en-US" sz="1800" b="1" dirty="0" err="1"/>
               <a:t>Memoization</a:t>
             </a:r>
+            <a:r>
+              <a:rPr lang="en-US" sz="1800" dirty="0"/>
+              <a:t> – Store the sub-problem output to avoid duplicate calculations</a:t>
+            </a:r>
+          </a:p>
+          <a:p>
             <a:endParaRPr lang="en-US" sz="1800" dirty="0"/>
           </a:p>
           <a:p>
             <a:r>
+              <a:rPr lang="en-US" sz="1800" b="1" dirty="0"/>
+              <a:t>Divide and Conquer </a:t>
+            </a:r>
+            <a:r>
               <a:rPr lang="en-US" sz="1800" dirty="0"/>
-              <a:t>Divide and Conquer</a:t>
-            </a:r>
+              <a:t>– Divide the problem into two or more subproblems.</a:t>
+            </a:r>
+          </a:p>
+          <a:p>
+            <a:r>
+              <a:rPr lang="en-US" dirty="0"/>
+              <a:t> However, Recursion in which we reduce the problem into a single subproblem is called </a:t>
+            </a:r>
+            <a:r>
+              <a:rPr lang="en-US" b="1" dirty="0"/>
+              <a:t>Decrease and Conquer</a:t>
+            </a:r>
+          </a:p>
+          <a:p>
+            <a:endParaRPr lang="en-US" sz="1800" dirty="0"/>
           </a:p>
           <a:p>
             <a:r>
@@ -6884,97 +6975,6 @@
 <file path=ppt/slides/slide18.xml><?xml version="1.0" encoding="utf-8"?>
 <p:sld xmlns:a="http://schemas.openxmlformats.org/drawingml/2006/main" xmlns:r="http://schemas.openxmlformats.org/officeDocument/2006/relationships" xmlns:p="http://schemas.openxmlformats.org/presentationml/2006/main">
   <p:cSld>
-    <p:spTree>
-      <p:nvGrpSpPr>
-        <p:cNvPr id="1" name=""/>
-        <p:cNvGrpSpPr/>
-        <p:nvPr/>
-      </p:nvGrpSpPr>
-      <p:grpSpPr>
-        <a:xfrm>
-          <a:off x="0" y="0"/>
-          <a:ext cx="0" cy="0"/>
-          <a:chOff x="0" y="0"/>
-          <a:chExt cx="0" cy="0"/>
-        </a:xfrm>
-      </p:grpSpPr>
-      <p:sp>
-        <p:nvSpPr>
-          <p:cNvPr id="2" name="Title 1">
-            <a:extLst>
-              <a:ext uri="{FF2B5EF4-FFF2-40B4-BE49-F238E27FC236}">
-                <a16:creationId xmlns:a16="http://schemas.microsoft.com/office/drawing/2014/main" id="{E2B4A084-1EA8-4806-B525-09C4A9881FCC}"/>
-              </a:ext>
-            </a:extLst>
-          </p:cNvPr>
-          <p:cNvSpPr>
-            <a:spLocks noGrp="1"/>
-          </p:cNvSpPr>
-          <p:nvPr>
-            <p:ph type="title"/>
-          </p:nvPr>
-        </p:nvSpPr>
-        <p:spPr/>
-        <p:txBody>
-          <a:bodyPr/>
-          <a:lstStyle/>
-          <a:p>
-            <a:r>
-              <a:rPr lang="en-US" dirty="0" err="1"/>
-              <a:t>BackTracking</a:t>
-            </a:r>
-            <a:endParaRPr lang="en-IN" dirty="0"/>
-          </a:p>
-        </p:txBody>
-      </p:sp>
-      <p:sp>
-        <p:nvSpPr>
-          <p:cNvPr id="3" name="Content Placeholder 2">
-            <a:extLst>
-              <a:ext uri="{FF2B5EF4-FFF2-40B4-BE49-F238E27FC236}">
-                <a16:creationId xmlns:a16="http://schemas.microsoft.com/office/drawing/2014/main" id="{23D64BDA-14AA-4E4C-8444-6BF76EC61984}"/>
-              </a:ext>
-            </a:extLst>
-          </p:cNvPr>
-          <p:cNvSpPr>
-            <a:spLocks noGrp="1"/>
-          </p:cNvSpPr>
-          <p:nvPr>
-            <p:ph idx="1"/>
-          </p:nvPr>
-        </p:nvSpPr>
-        <p:spPr/>
-        <p:txBody>
-          <a:bodyPr/>
-          <a:lstStyle/>
-          <a:p>
-            <a:pPr marL="0" indent="0">
-              <a:buNone/>
-            </a:pPr>
-            <a:r>
-              <a:rPr lang="en-US" dirty="0"/>
-              <a:t>Once a path is not leading to solution, we don’t further explore it and go back and search for other paths</a:t>
-            </a:r>
-            <a:endParaRPr lang="en-IN" dirty="0"/>
-          </a:p>
-        </p:txBody>
-      </p:sp>
-    </p:spTree>
-    <p:extLst>
-      <p:ext uri="{BB962C8B-B14F-4D97-AF65-F5344CB8AC3E}">
-        <p14:creationId xmlns:p14="http://schemas.microsoft.com/office/powerpoint/2010/main" val="2339581286"/>
-      </p:ext>
-    </p:extLst>
-  </p:cSld>
-  <p:clrMapOvr>
-    <a:masterClrMapping/>
-  </p:clrMapOvr>
-</p:sld>
-</file>
-
-<file path=ppt/slides/slide19.xml><?xml version="1.0" encoding="utf-8"?>
-<p:sld xmlns:a="http://schemas.openxmlformats.org/drawingml/2006/main" xmlns:r="http://schemas.openxmlformats.org/officeDocument/2006/relationships" xmlns:p="http://schemas.openxmlformats.org/presentationml/2006/main">
-  <p:cSld>
     <p:bg>
       <p:bgPr>
         <a:solidFill>
@@ -7150,7 +7150,7 @@
                   </a:schemeClr>
                 </a:solidFill>
               </a:rPr>
-              <a:t>N Queens - II</a:t>
+              <a:t>Master Theorem</a:t>
             </a:r>
             <a:br>
               <a:rPr lang="en-US" sz="2000" b="1" dirty="0">
@@ -7171,7 +7171,7 @@
                   </a:schemeClr>
                 </a:solidFill>
               </a:rPr>
-              <a:t>https://leetcode.com/explore/learn/card/recursion-ii/472/backtracking/2804/</a:t>
+              <a:t>https://leetcode.com/explore/learn/card/recursion-ii/470/divide-and-conquer/2871/</a:t>
             </a:r>
           </a:p>
         </p:txBody>
@@ -7213,7 +7213,7 @@
           <p:cNvPr id="5" name="Picture 4">
             <a:extLst>
               <a:ext uri="{FF2B5EF4-FFF2-40B4-BE49-F238E27FC236}">
-                <a16:creationId xmlns:a16="http://schemas.microsoft.com/office/drawing/2014/main" id="{1AC44065-66BD-46E6-BE0C-EAB9F55B269E}"/>
+                <a16:creationId xmlns:a16="http://schemas.microsoft.com/office/drawing/2014/main" id="{0E7AB9F1-B8EC-7A42-AD14-9379B7F8CD32}"/>
               </a:ext>
             </a:extLst>
           </p:cNvPr>
@@ -7230,8 +7230,8 @@
         </p:blipFill>
         <p:spPr>
           <a:xfrm>
-            <a:off x="4814582" y="666750"/>
-            <a:ext cx="6626840" cy="5742214"/>
+            <a:off x="4307771" y="1463414"/>
+            <a:ext cx="7640462" cy="3931172"/>
           </a:xfrm>
           <a:prstGeom prst="rect">
             <a:avLst/>
@@ -7241,12 +7241,103 @@
     </p:spTree>
     <p:extLst>
       <p:ext uri="{BB962C8B-B14F-4D97-AF65-F5344CB8AC3E}">
-        <p14:creationId xmlns:p14="http://schemas.microsoft.com/office/powerpoint/2010/main" val="688666872"/>
+        <p14:creationId xmlns:p14="http://schemas.microsoft.com/office/powerpoint/2010/main" val="1522715166"/>
       </p:ext>
     </p:extLst>
   </p:cSld>
   <p:clrMapOvr>
     <a:overrideClrMapping bg1="lt1" tx1="dk1" bg2="lt2" tx2="dk2" accent1="accent1" accent2="accent2" accent3="accent3" accent4="accent4" accent5="accent5" accent6="accent6" hlink="hlink" folHlink="folHlink"/>
+  </p:clrMapOvr>
+</p:sld>
+</file>
+
+<file path=ppt/slides/slide19.xml><?xml version="1.0" encoding="utf-8"?>
+<p:sld xmlns:a="http://schemas.openxmlformats.org/drawingml/2006/main" xmlns:r="http://schemas.openxmlformats.org/officeDocument/2006/relationships" xmlns:p="http://schemas.openxmlformats.org/presentationml/2006/main">
+  <p:cSld>
+    <p:spTree>
+      <p:nvGrpSpPr>
+        <p:cNvPr id="1" name=""/>
+        <p:cNvGrpSpPr/>
+        <p:nvPr/>
+      </p:nvGrpSpPr>
+      <p:grpSpPr>
+        <a:xfrm>
+          <a:off x="0" y="0"/>
+          <a:ext cx="0" cy="0"/>
+          <a:chOff x="0" y="0"/>
+          <a:chExt cx="0" cy="0"/>
+        </a:xfrm>
+      </p:grpSpPr>
+      <p:sp>
+        <p:nvSpPr>
+          <p:cNvPr id="2" name="Title 1">
+            <a:extLst>
+              <a:ext uri="{FF2B5EF4-FFF2-40B4-BE49-F238E27FC236}">
+                <a16:creationId xmlns:a16="http://schemas.microsoft.com/office/drawing/2014/main" id="{E2B4A084-1EA8-4806-B525-09C4A9881FCC}"/>
+              </a:ext>
+            </a:extLst>
+          </p:cNvPr>
+          <p:cNvSpPr>
+            <a:spLocks noGrp="1"/>
+          </p:cNvSpPr>
+          <p:nvPr>
+            <p:ph type="title"/>
+          </p:nvPr>
+        </p:nvSpPr>
+        <p:spPr/>
+        <p:txBody>
+          <a:bodyPr/>
+          <a:lstStyle/>
+          <a:p>
+            <a:r>
+              <a:rPr lang="en-US" dirty="0" err="1"/>
+              <a:t>BackTracking</a:t>
+            </a:r>
+            <a:endParaRPr lang="en-IN" dirty="0"/>
+          </a:p>
+        </p:txBody>
+      </p:sp>
+      <p:sp>
+        <p:nvSpPr>
+          <p:cNvPr id="3" name="Content Placeholder 2">
+            <a:extLst>
+              <a:ext uri="{FF2B5EF4-FFF2-40B4-BE49-F238E27FC236}">
+                <a16:creationId xmlns:a16="http://schemas.microsoft.com/office/drawing/2014/main" id="{23D64BDA-14AA-4E4C-8444-6BF76EC61984}"/>
+              </a:ext>
+            </a:extLst>
+          </p:cNvPr>
+          <p:cNvSpPr>
+            <a:spLocks noGrp="1"/>
+          </p:cNvSpPr>
+          <p:nvPr>
+            <p:ph idx="1"/>
+          </p:nvPr>
+        </p:nvSpPr>
+        <p:spPr/>
+        <p:txBody>
+          <a:bodyPr/>
+          <a:lstStyle/>
+          <a:p>
+            <a:pPr marL="0" indent="0">
+              <a:buNone/>
+            </a:pPr>
+            <a:r>
+              <a:rPr lang="en-US" dirty="0"/>
+              <a:t>Once a path is not leading to solution, we don’t further explore it and go back and search for other paths</a:t>
+            </a:r>
+            <a:endParaRPr lang="en-IN" dirty="0"/>
+          </a:p>
+        </p:txBody>
+      </p:sp>
+    </p:spTree>
+    <p:extLst>
+      <p:ext uri="{BB962C8B-B14F-4D97-AF65-F5344CB8AC3E}">
+        <p14:creationId xmlns:p14="http://schemas.microsoft.com/office/powerpoint/2010/main" val="2339581286"/>
+      </p:ext>
+    </p:extLst>
+  </p:cSld>
+  <p:clrMapOvr>
+    <a:masterClrMapping/>
   </p:clrMapOvr>
 </p:sld>
 </file>
@@ -7708,7 +7799,7 @@
                   </a:schemeClr>
                 </a:solidFill>
               </a:rPr>
-              <a:t>Sudoku Solver</a:t>
+              <a:t>N Queens - II</a:t>
             </a:r>
             <a:br>
               <a:rPr lang="en-US" sz="2000" b="1" dirty="0">
@@ -7729,7 +7820,7 @@
                   </a:schemeClr>
                 </a:solidFill>
               </a:rPr>
-              <a:t>https://leetcode.com/explore/learn/card/recursion-ii/472/backtracking/2796/</a:t>
+              <a:t>https://leetcode.com/explore/learn/card/recursion-ii/472/backtracking/2804/</a:t>
             </a:r>
           </a:p>
         </p:txBody>
@@ -7768,10 +7859,10 @@
       </p:sp>
       <p:pic>
         <p:nvPicPr>
-          <p:cNvPr id="6" name="Picture 5">
-            <a:extLst>
-              <a:ext uri="{FF2B5EF4-FFF2-40B4-BE49-F238E27FC236}">
-                <a16:creationId xmlns:a16="http://schemas.microsoft.com/office/drawing/2014/main" id="{993480BE-CE3E-498E-A14F-22AF28C906B5}"/>
+          <p:cNvPr id="5" name="Picture 4">
+            <a:extLst>
+              <a:ext uri="{FF2B5EF4-FFF2-40B4-BE49-F238E27FC236}">
+                <a16:creationId xmlns:a16="http://schemas.microsoft.com/office/drawing/2014/main" id="{1AC44065-66BD-46E6-BE0C-EAB9F55B269E}"/>
               </a:ext>
             </a:extLst>
           </p:cNvPr>
@@ -7788,8 +7879,8 @@
         </p:blipFill>
         <p:spPr>
           <a:xfrm>
-            <a:off x="4977894" y="374904"/>
-            <a:ext cx="6300216" cy="6057900"/>
+            <a:off x="4814582" y="666750"/>
+            <a:ext cx="6626840" cy="5742214"/>
           </a:xfrm>
           <a:prstGeom prst="rect">
             <a:avLst/>
@@ -7799,7 +7890,7 @@
     </p:spTree>
     <p:extLst>
       <p:ext uri="{BB962C8B-B14F-4D97-AF65-F5344CB8AC3E}">
-        <p14:creationId xmlns:p14="http://schemas.microsoft.com/office/powerpoint/2010/main" val="3349669834"/>
+        <p14:creationId xmlns:p14="http://schemas.microsoft.com/office/powerpoint/2010/main" val="688666872"/>
       </p:ext>
     </p:extLst>
   </p:cSld>
@@ -7987,7 +8078,7 @@
                   </a:schemeClr>
                 </a:solidFill>
               </a:rPr>
-              <a:t>Combinations</a:t>
+              <a:t>Sudoku Solver</a:t>
             </a:r>
             <a:br>
               <a:rPr lang="en-US" sz="2000" b="1" dirty="0">
@@ -8008,7 +8099,7 @@
                   </a:schemeClr>
                 </a:solidFill>
               </a:rPr>
-              <a:t>https://leetcode.com/explore/learn/card/recursion-ii/472/backtracking/2798/</a:t>
+              <a:t>https://leetcode.com/explore/learn/card/recursion-ii/472/backtracking/2796/</a:t>
             </a:r>
           </a:p>
         </p:txBody>
@@ -8047,10 +8138,10 @@
       </p:sp>
       <p:pic>
         <p:nvPicPr>
-          <p:cNvPr id="8" name="Picture 7">
-            <a:extLst>
-              <a:ext uri="{FF2B5EF4-FFF2-40B4-BE49-F238E27FC236}">
-                <a16:creationId xmlns:a16="http://schemas.microsoft.com/office/drawing/2014/main" id="{F8F98E8C-B9C3-42E6-A97A-CCB7CFFEA99F}"/>
+          <p:cNvPr id="6" name="Picture 5">
+            <a:extLst>
+              <a:ext uri="{FF2B5EF4-FFF2-40B4-BE49-F238E27FC236}">
+                <a16:creationId xmlns:a16="http://schemas.microsoft.com/office/drawing/2014/main" id="{993480BE-CE3E-498E-A14F-22AF28C906B5}"/>
               </a:ext>
             </a:extLst>
           </p:cNvPr>
@@ -8067,8 +8158,8 @@
         </p:blipFill>
         <p:spPr>
           <a:xfrm>
-            <a:off x="4826229" y="919842"/>
-            <a:ext cx="6068329" cy="3499757"/>
+            <a:off x="4977894" y="374904"/>
+            <a:ext cx="6300216" cy="6057900"/>
           </a:xfrm>
           <a:prstGeom prst="rect">
             <a:avLst/>
@@ -8078,7 +8169,7 @@
     </p:spTree>
     <p:extLst>
       <p:ext uri="{BB962C8B-B14F-4D97-AF65-F5344CB8AC3E}">
-        <p14:creationId xmlns:p14="http://schemas.microsoft.com/office/powerpoint/2010/main" val="2380976295"/>
+        <p14:creationId xmlns:p14="http://schemas.microsoft.com/office/powerpoint/2010/main" val="3349669834"/>
       </p:ext>
     </p:extLst>
   </p:cSld>
@@ -8247,7 +8338,7 @@
         </p:nvSpPr>
         <p:spPr>
           <a:xfrm>
-            <a:off x="420591" y="776140"/>
+            <a:off x="403816" y="1437567"/>
             <a:ext cx="3640228" cy="625275"/>
           </a:xfrm>
         </p:spPr>
@@ -8266,7 +8357,7 @@
                   </a:schemeClr>
                 </a:solidFill>
               </a:rPr>
-              <a:t>Convert Binary Search Tree to Doubly Linked list</a:t>
+              <a:t>Combinations</a:t>
             </a:r>
             <a:br>
               <a:rPr lang="en-US" sz="2000" b="1" dirty="0">
@@ -8287,7 +8378,7 @@
                   </a:schemeClr>
                 </a:solidFill>
               </a:rPr>
-              <a:t>https://leetcode.com/explore/learn/card/recursion-ii/507/beyond-recursion/2899/</a:t>
+              <a:t>https://leetcode.com/explore/learn/card/recursion-ii/472/backtracking/2798/</a:t>
             </a:r>
           </a:p>
         </p:txBody>
@@ -8326,10 +8417,10 @@
       </p:sp>
       <p:pic>
         <p:nvPicPr>
-          <p:cNvPr id="5" name="Picture 4">
-            <a:extLst>
-              <a:ext uri="{FF2B5EF4-FFF2-40B4-BE49-F238E27FC236}">
-                <a16:creationId xmlns:a16="http://schemas.microsoft.com/office/drawing/2014/main" id="{ED0884AD-0E8B-459C-88B0-4FB6EE5BAE78}"/>
+          <p:cNvPr id="8" name="Picture 7">
+            <a:extLst>
+              <a:ext uri="{FF2B5EF4-FFF2-40B4-BE49-F238E27FC236}">
+                <a16:creationId xmlns:a16="http://schemas.microsoft.com/office/drawing/2014/main" id="{F8F98E8C-B9C3-42E6-A97A-CCB7CFFEA99F}"/>
               </a:ext>
             </a:extLst>
           </p:cNvPr>
@@ -8346,84 +8437,18 @@
         </p:blipFill>
         <p:spPr>
           <a:xfrm>
-            <a:off x="5094923" y="1088778"/>
-            <a:ext cx="5091523" cy="4680443"/>
+            <a:off x="4826229" y="919842"/>
+            <a:ext cx="6068329" cy="3499757"/>
           </a:xfrm>
           <a:prstGeom prst="rect">
             <a:avLst/>
           </a:prstGeom>
         </p:spPr>
       </p:pic>
-      <p:pic>
-        <p:nvPicPr>
-          <p:cNvPr id="7" name="Picture 6">
-            <a:extLst>
-              <a:ext uri="{FF2B5EF4-FFF2-40B4-BE49-F238E27FC236}">
-                <a16:creationId xmlns:a16="http://schemas.microsoft.com/office/drawing/2014/main" id="{C49B3BBF-35AD-4953-94C5-7A46A93B3C79}"/>
-              </a:ext>
-            </a:extLst>
-          </p:cNvPr>
-          <p:cNvPicPr>
-            <a:picLocks noChangeAspect="1"/>
-          </p:cNvPicPr>
-          <p:nvPr/>
-        </p:nvPicPr>
-        <p:blipFill>
-          <a:blip r:embed="rId3"/>
-          <a:stretch>
-            <a:fillRect/>
-          </a:stretch>
-        </p:blipFill>
-        <p:spPr>
-          <a:xfrm>
-            <a:off x="396278" y="2818312"/>
-            <a:ext cx="3845164" cy="3664784"/>
-          </a:xfrm>
-          <a:prstGeom prst="rect">
-            <a:avLst/>
-          </a:prstGeom>
-        </p:spPr>
-      </p:pic>
-      <p:sp>
-        <p:nvSpPr>
-          <p:cNvPr id="9" name="TextBox 8">
-            <a:extLst>
-              <a:ext uri="{FF2B5EF4-FFF2-40B4-BE49-F238E27FC236}">
-                <a16:creationId xmlns:a16="http://schemas.microsoft.com/office/drawing/2014/main" id="{02CA16F0-4947-47BE-923D-6A8BBA462A3D}"/>
-              </a:ext>
-            </a:extLst>
-          </p:cNvPr>
-          <p:cNvSpPr txBox="1"/>
-          <p:nvPr/>
-        </p:nvSpPr>
-        <p:spPr>
-          <a:xfrm>
-            <a:off x="478971" y="2443843"/>
-            <a:ext cx="3260272" cy="369332"/>
-          </a:xfrm>
-          <a:prstGeom prst="rect">
-            <a:avLst/>
-          </a:prstGeom>
-          <a:noFill/>
-        </p:spPr>
-        <p:txBody>
-          <a:bodyPr wrap="square" rtlCol="0">
-            <a:spAutoFit/>
-          </a:bodyPr>
-          <a:lstStyle/>
-          <a:p>
-            <a:r>
-              <a:rPr lang="en-US" dirty="0"/>
-              <a:t>Iterative Solution</a:t>
-            </a:r>
-            <a:endParaRPr lang="en-IN" dirty="0"/>
-          </a:p>
-        </p:txBody>
-      </p:sp>
     </p:spTree>
     <p:extLst>
       <p:ext uri="{BB962C8B-B14F-4D97-AF65-F5344CB8AC3E}">
-        <p14:creationId xmlns:p14="http://schemas.microsoft.com/office/powerpoint/2010/main" val="1276059753"/>
+        <p14:creationId xmlns:p14="http://schemas.microsoft.com/office/powerpoint/2010/main" val="2380976295"/>
       </p:ext>
     </p:extLst>
   </p:cSld>
@@ -8611,7 +8636,7 @@
                   </a:schemeClr>
                 </a:solidFill>
               </a:rPr>
-              <a:t>Largest Rectangle in Histogram</a:t>
+              <a:t>Convert Binary Search Tree to Doubly Linked list</a:t>
             </a:r>
             <a:br>
               <a:rPr lang="en-US" sz="2000" b="1" dirty="0">
@@ -8632,7 +8657,7 @@
                   </a:schemeClr>
                 </a:solidFill>
               </a:rPr>
-              <a:t>https://leetcode.com/explore/learn/card/recursion-ii/507/beyond-recursion/2901/</a:t>
+              <a:t>https://leetcode.com/explore/learn/card/recursion-ii/507/beyond-recursion/2899/</a:t>
             </a:r>
           </a:p>
         </p:txBody>
@@ -8671,10 +8696,10 @@
       </p:sp>
       <p:pic>
         <p:nvPicPr>
-          <p:cNvPr id="6" name="Picture 5">
-            <a:extLst>
-              <a:ext uri="{FF2B5EF4-FFF2-40B4-BE49-F238E27FC236}">
-                <a16:creationId xmlns:a16="http://schemas.microsoft.com/office/drawing/2014/main" id="{9A7A0BA7-106A-4547-AC22-8B36588B47A3}"/>
+          <p:cNvPr id="5" name="Picture 4">
+            <a:extLst>
+              <a:ext uri="{FF2B5EF4-FFF2-40B4-BE49-F238E27FC236}">
+                <a16:creationId xmlns:a16="http://schemas.microsoft.com/office/drawing/2014/main" id="{ED0884AD-0E8B-459C-88B0-4FB6EE5BAE78}"/>
               </a:ext>
             </a:extLst>
           </p:cNvPr>
@@ -8691,18 +8716,84 @@
         </p:blipFill>
         <p:spPr>
           <a:xfrm>
-            <a:off x="4534847" y="776140"/>
-            <a:ext cx="7112867" cy="4629830"/>
+            <a:off x="5094923" y="1088778"/>
+            <a:ext cx="5091523" cy="4680443"/>
           </a:xfrm>
           <a:prstGeom prst="rect">
             <a:avLst/>
           </a:prstGeom>
         </p:spPr>
       </p:pic>
+      <p:pic>
+        <p:nvPicPr>
+          <p:cNvPr id="7" name="Picture 6">
+            <a:extLst>
+              <a:ext uri="{FF2B5EF4-FFF2-40B4-BE49-F238E27FC236}">
+                <a16:creationId xmlns:a16="http://schemas.microsoft.com/office/drawing/2014/main" id="{C49B3BBF-35AD-4953-94C5-7A46A93B3C79}"/>
+              </a:ext>
+            </a:extLst>
+          </p:cNvPr>
+          <p:cNvPicPr>
+            <a:picLocks noChangeAspect="1"/>
+          </p:cNvPicPr>
+          <p:nvPr/>
+        </p:nvPicPr>
+        <p:blipFill>
+          <a:blip r:embed="rId3"/>
+          <a:stretch>
+            <a:fillRect/>
+          </a:stretch>
+        </p:blipFill>
+        <p:spPr>
+          <a:xfrm>
+            <a:off x="396278" y="2818312"/>
+            <a:ext cx="3845164" cy="3664784"/>
+          </a:xfrm>
+          <a:prstGeom prst="rect">
+            <a:avLst/>
+          </a:prstGeom>
+        </p:spPr>
+      </p:pic>
+      <p:sp>
+        <p:nvSpPr>
+          <p:cNvPr id="9" name="TextBox 8">
+            <a:extLst>
+              <a:ext uri="{FF2B5EF4-FFF2-40B4-BE49-F238E27FC236}">
+                <a16:creationId xmlns:a16="http://schemas.microsoft.com/office/drawing/2014/main" id="{02CA16F0-4947-47BE-923D-6A8BBA462A3D}"/>
+              </a:ext>
+            </a:extLst>
+          </p:cNvPr>
+          <p:cNvSpPr txBox="1"/>
+          <p:nvPr/>
+        </p:nvSpPr>
+        <p:spPr>
+          <a:xfrm>
+            <a:off x="478971" y="2443843"/>
+            <a:ext cx="3260272" cy="369332"/>
+          </a:xfrm>
+          <a:prstGeom prst="rect">
+            <a:avLst/>
+          </a:prstGeom>
+          <a:noFill/>
+        </p:spPr>
+        <p:txBody>
+          <a:bodyPr wrap="square" rtlCol="0">
+            <a:spAutoFit/>
+          </a:bodyPr>
+          <a:lstStyle/>
+          <a:p>
+            <a:r>
+              <a:rPr lang="en-US" dirty="0"/>
+              <a:t>Iterative Solution</a:t>
+            </a:r>
+            <a:endParaRPr lang="en-IN" dirty="0"/>
+          </a:p>
+        </p:txBody>
+      </p:sp>
     </p:spTree>
     <p:extLst>
       <p:ext uri="{BB962C8B-B14F-4D97-AF65-F5344CB8AC3E}">
-        <p14:creationId xmlns:p14="http://schemas.microsoft.com/office/powerpoint/2010/main" val="2359022914"/>
+        <p14:creationId xmlns:p14="http://schemas.microsoft.com/office/powerpoint/2010/main" val="1276059753"/>
       </p:ext>
     </p:extLst>
   </p:cSld>
@@ -8882,6 +8973,285 @@
           <a:lstStyle/>
           <a:p>
             <a:r>
+              <a:rPr lang="en-US" sz="2000" b="1" dirty="0">
+                <a:solidFill>
+                  <a:schemeClr val="tx1">
+                    <a:lumMod val="75000"/>
+                    <a:lumOff val="25000"/>
+                  </a:schemeClr>
+                </a:solidFill>
+              </a:rPr>
+              <a:t>Largest Rectangle in Histogram</a:t>
+            </a:r>
+            <a:br>
+              <a:rPr lang="en-US" sz="2000" b="1" dirty="0">
+                <a:solidFill>
+                  <a:schemeClr val="tx1">
+                    <a:lumMod val="75000"/>
+                    <a:lumOff val="25000"/>
+                  </a:schemeClr>
+                </a:solidFill>
+              </a:rPr>
+            </a:br>
+            <a:r>
+              <a:rPr lang="en-US" sz="2000" b="1" dirty="0">
+                <a:solidFill>
+                  <a:schemeClr val="tx1">
+                    <a:lumMod val="75000"/>
+                    <a:lumOff val="25000"/>
+                  </a:schemeClr>
+                </a:solidFill>
+              </a:rPr>
+              <a:t>https://leetcode.com/explore/learn/card/recursion-ii/507/beyond-recursion/2901/</a:t>
+            </a:r>
+          </a:p>
+        </p:txBody>
+      </p:sp>
+      <p:sp>
+        <p:nvSpPr>
+          <p:cNvPr id="3" name="TextBox 2">
+            <a:extLst>
+              <a:ext uri="{FF2B5EF4-FFF2-40B4-BE49-F238E27FC236}">
+                <a16:creationId xmlns:a16="http://schemas.microsoft.com/office/drawing/2014/main" id="{5357342F-320C-4BC6-B7D8-BCE7AF0790A9}"/>
+              </a:ext>
+            </a:extLst>
+          </p:cNvPr>
+          <p:cNvSpPr txBox="1"/>
+          <p:nvPr/>
+        </p:nvSpPr>
+        <p:spPr>
+          <a:xfrm>
+            <a:off x="683302" y="2280557"/>
+            <a:ext cx="3815443" cy="1257300"/>
+          </a:xfrm>
+          <a:prstGeom prst="rect">
+            <a:avLst/>
+          </a:prstGeom>
+          <a:noFill/>
+        </p:spPr>
+        <p:txBody>
+          <a:bodyPr wrap="square" rtlCol="0">
+            <a:spAutoFit/>
+          </a:bodyPr>
+          <a:lstStyle/>
+          <a:p>
+            <a:endParaRPr lang="en-IN" dirty="0"/>
+          </a:p>
+        </p:txBody>
+      </p:sp>
+      <p:pic>
+        <p:nvPicPr>
+          <p:cNvPr id="6" name="Picture 5">
+            <a:extLst>
+              <a:ext uri="{FF2B5EF4-FFF2-40B4-BE49-F238E27FC236}">
+                <a16:creationId xmlns:a16="http://schemas.microsoft.com/office/drawing/2014/main" id="{9A7A0BA7-106A-4547-AC22-8B36588B47A3}"/>
+              </a:ext>
+            </a:extLst>
+          </p:cNvPr>
+          <p:cNvPicPr>
+            <a:picLocks noChangeAspect="1"/>
+          </p:cNvPicPr>
+          <p:nvPr/>
+        </p:nvPicPr>
+        <p:blipFill>
+          <a:blip r:embed="rId2"/>
+          <a:stretch>
+            <a:fillRect/>
+          </a:stretch>
+        </p:blipFill>
+        <p:spPr>
+          <a:xfrm>
+            <a:off x="4534847" y="776140"/>
+            <a:ext cx="7112867" cy="4629830"/>
+          </a:xfrm>
+          <a:prstGeom prst="rect">
+            <a:avLst/>
+          </a:prstGeom>
+        </p:spPr>
+      </p:pic>
+    </p:spTree>
+    <p:extLst>
+      <p:ext uri="{BB962C8B-B14F-4D97-AF65-F5344CB8AC3E}">
+        <p14:creationId xmlns:p14="http://schemas.microsoft.com/office/powerpoint/2010/main" val="2359022914"/>
+      </p:ext>
+    </p:extLst>
+  </p:cSld>
+  <p:clrMapOvr>
+    <a:overrideClrMapping bg1="lt1" tx1="dk1" bg2="lt2" tx2="dk2" accent1="accent1" accent2="accent2" accent3="accent3" accent4="accent4" accent5="accent5" accent6="accent6" hlink="hlink" folHlink="folHlink"/>
+  </p:clrMapOvr>
+</p:sld>
+</file>
+
+<file path=ppt/slides/slide25.xml><?xml version="1.0" encoding="utf-8"?>
+<p:sld xmlns:a="http://schemas.openxmlformats.org/drawingml/2006/main" xmlns:r="http://schemas.openxmlformats.org/officeDocument/2006/relationships" xmlns:p="http://schemas.openxmlformats.org/presentationml/2006/main">
+  <p:cSld>
+    <p:bg>
+      <p:bgPr>
+        <a:solidFill>
+          <a:schemeClr val="bg1"/>
+        </a:solidFill>
+        <a:effectLst/>
+      </p:bgPr>
+    </p:bg>
+    <p:spTree>
+      <p:nvGrpSpPr>
+        <p:cNvPr id="1" name=""/>
+        <p:cNvGrpSpPr/>
+        <p:nvPr/>
+      </p:nvGrpSpPr>
+      <p:grpSpPr>
+        <a:xfrm>
+          <a:off x="0" y="0"/>
+          <a:ext cx="0" cy="0"/>
+          <a:chOff x="0" y="0"/>
+          <a:chExt cx="0" cy="0"/>
+        </a:xfrm>
+      </p:grpSpPr>
+      <p:sp>
+        <p:nvSpPr>
+          <p:cNvPr id="29" name="Rectangle 22">
+            <a:extLst>
+              <a:ext uri="{FF2B5EF4-FFF2-40B4-BE49-F238E27FC236}">
+                <a16:creationId xmlns:a16="http://schemas.microsoft.com/office/drawing/2014/main" id="{F5380E9A-163E-4576-BCDD-0A450B7E9097}"/>
+              </a:ext>
+              <a:ext uri="{C183D7F6-B498-43B3-948B-1728B52AA6E4}">
+                <adec:decorative xmlns:adec="http://schemas.microsoft.com/office/drawing/2017/decorative" val="1"/>
+              </a:ext>
+            </a:extLst>
+          </p:cNvPr>
+          <p:cNvSpPr>
+            <a:spLocks noGrp="1" noRot="1" noChangeAspect="1" noMove="1" noResize="1" noEditPoints="1" noAdjustHandles="1" noChangeArrowheads="1" noChangeShapeType="1" noTextEdit="1"/>
+          </p:cNvSpPr>
+          <p:nvPr>
+            <p:extLst>
+              <p:ext uri="{386F3935-93C4-4BCD-93E2-E3B085C9AB24}">
+                <p16:designElem xmlns:p16="http://schemas.microsoft.com/office/powerpoint/2015/main" val="1"/>
+              </p:ext>
+            </p:extLst>
+          </p:nvPr>
+        </p:nvSpPr>
+        <p:spPr>
+          <a:xfrm>
+            <a:off x="4279943" y="237744"/>
+            <a:ext cx="7652977" cy="6382512"/>
+          </a:xfrm>
+          <a:prstGeom prst="rect">
+            <a:avLst/>
+          </a:prstGeom>
+          <a:solidFill>
+            <a:schemeClr val="bg1">
+              <a:alpha val="94000"/>
+            </a:schemeClr>
+          </a:solidFill>
+          <a:ln>
+            <a:noFill/>
+          </a:ln>
+        </p:spPr>
+        <p:style>
+          <a:lnRef idx="2">
+            <a:schemeClr val="accent1">
+              <a:shade val="50000"/>
+            </a:schemeClr>
+          </a:lnRef>
+          <a:fillRef idx="1">
+            <a:schemeClr val="accent1"/>
+          </a:fillRef>
+          <a:effectRef idx="0">
+            <a:schemeClr val="accent1"/>
+          </a:effectRef>
+          <a:fontRef idx="minor">
+            <a:schemeClr val="lt1"/>
+          </a:fontRef>
+        </p:style>
+      </p:sp>
+      <p:sp>
+        <p:nvSpPr>
+          <p:cNvPr id="30" name="Rectangle 24">
+            <a:extLst>
+              <a:ext uri="{FF2B5EF4-FFF2-40B4-BE49-F238E27FC236}">
+                <a16:creationId xmlns:a16="http://schemas.microsoft.com/office/drawing/2014/main" id="{88DDEF77-9746-4D83-91F9-442A2487E666}"/>
+              </a:ext>
+              <a:ext uri="{C183D7F6-B498-43B3-948B-1728B52AA6E4}">
+                <adec:decorative xmlns:adec="http://schemas.microsoft.com/office/drawing/2017/decorative" val="1"/>
+              </a:ext>
+            </a:extLst>
+          </p:cNvPr>
+          <p:cNvSpPr>
+            <a:spLocks noGrp="1" noRot="1" noChangeAspect="1" noMove="1" noResize="1" noEditPoints="1" noAdjustHandles="1" noChangeArrowheads="1" noChangeShapeType="1" noTextEdit="1"/>
+          </p:cNvSpPr>
+          <p:nvPr>
+            <p:extLst>
+              <p:ext uri="{386F3935-93C4-4BCD-93E2-E3B085C9AB24}">
+                <p16:designElem xmlns:p16="http://schemas.microsoft.com/office/powerpoint/2015/main" val="1"/>
+              </p:ext>
+            </p:extLst>
+          </p:nvPr>
+        </p:nvSpPr>
+        <p:spPr>
+          <a:xfrm>
+            <a:off x="4417103" y="374904"/>
+            <a:ext cx="7340156" cy="6108192"/>
+          </a:xfrm>
+          <a:prstGeom prst="rect">
+            <a:avLst/>
+          </a:prstGeom>
+          <a:noFill/>
+          <a:ln w="6350" cap="sq">
+            <a:solidFill>
+              <a:schemeClr val="tx1">
+                <a:lumMod val="65000"/>
+                <a:lumOff val="35000"/>
+              </a:schemeClr>
+            </a:solidFill>
+            <a:miter lim="800000"/>
+          </a:ln>
+        </p:spPr>
+        <p:style>
+          <a:lnRef idx="2">
+            <a:schemeClr val="accent1">
+              <a:shade val="50000"/>
+            </a:schemeClr>
+          </a:lnRef>
+          <a:fillRef idx="1">
+            <a:schemeClr val="accent1"/>
+          </a:fillRef>
+          <a:effectRef idx="0">
+            <a:schemeClr val="accent1"/>
+          </a:effectRef>
+          <a:fontRef idx="minor">
+            <a:schemeClr val="lt1"/>
+          </a:fontRef>
+        </p:style>
+      </p:sp>
+      <p:sp>
+        <p:nvSpPr>
+          <p:cNvPr id="2" name="Title 1">
+            <a:extLst>
+              <a:ext uri="{FF2B5EF4-FFF2-40B4-BE49-F238E27FC236}">
+                <a16:creationId xmlns:a16="http://schemas.microsoft.com/office/drawing/2014/main" id="{92C9295F-E638-4F61-AFE2-CF3E40556031}"/>
+              </a:ext>
+            </a:extLst>
+          </p:cNvPr>
+          <p:cNvSpPr>
+            <a:spLocks noGrp="1"/>
+          </p:cNvSpPr>
+          <p:nvPr>
+            <p:ph type="title"/>
+          </p:nvPr>
+        </p:nvSpPr>
+        <p:spPr>
+          <a:xfrm>
+            <a:off x="420591" y="776140"/>
+            <a:ext cx="3640228" cy="625275"/>
+          </a:xfrm>
+        </p:spPr>
+        <p:txBody>
+          <a:bodyPr>
+            <a:normAutofit fontScale="90000"/>
+          </a:bodyPr>
+          <a:lstStyle/>
+          <a:p>
+            <a:r>
               <a:rPr lang="en-US" sz="2000" b="1">
                 <a:solidFill>
                   <a:schemeClr val="tx1">
@@ -8999,7 +9369,7 @@
 </p:sld>
 </file>
 
-<file path=ppt/slides/slide25.xml><?xml version="1.0" encoding="utf-8"?>
+<file path=ppt/slides/slide26.xml><?xml version="1.0" encoding="utf-8"?>
 <p:sld xmlns:a="http://schemas.openxmlformats.org/drawingml/2006/main" xmlns:r="http://schemas.openxmlformats.org/officeDocument/2006/relationships" xmlns:p="http://schemas.openxmlformats.org/presentationml/2006/main">
   <p:cSld>
     <p:spTree>
@@ -11705,21 +12075,21 @@
 </file>
 
 <file path=customXml/item1.xml><?xml version="1.0" encoding="utf-8"?>
+<p:properties xmlns:p="http://schemas.microsoft.com/office/2006/metadata/properties" xmlns:xsi="http://www.w3.org/2001/XMLSchema-instance" xmlns:pc="http://schemas.microsoft.com/office/infopath/2007/PartnerControls">
+  <documentManagement>
+    <Status xmlns="71af3243-3dd4-4a8d-8c0d-dd76da1f02a5">Not started</Status>
+    <MediaServiceKeyPoints xmlns="71af3243-3dd4-4a8d-8c0d-dd76da1f02a5" xsi:nil="true"/>
+  </documentManagement>
+</p:properties>
+</file>
+
+<file path=customXml/item2.xml><?xml version="1.0" encoding="utf-8"?>
 <?mso-contentType ?>
 <FormTemplates xmlns="http://schemas.microsoft.com/sharepoint/v3/contenttype/forms">
   <Display>DocumentLibraryForm</Display>
   <Edit>DocumentLibraryForm</Edit>
   <New>DocumentLibraryForm</New>
 </FormTemplates>
-</file>
-
-<file path=customXml/item2.xml><?xml version="1.0" encoding="utf-8"?>
-<p:properties xmlns:p="http://schemas.microsoft.com/office/2006/metadata/properties" xmlns:xsi="http://www.w3.org/2001/XMLSchema-instance" xmlns:pc="http://schemas.microsoft.com/office/infopath/2007/PartnerControls">
-  <documentManagement>
-    <Status xmlns="71af3243-3dd4-4a8d-8c0d-dd76da1f02a5">Not started</Status>
-    <MediaServiceKeyPoints xmlns="71af3243-3dd4-4a8d-8c0d-dd76da1f02a5" xsi:nil="true"/>
-  </documentManagement>
-</p:properties>
 </file>
 
 <file path=customXml/item3.xml><?xml version="1.0" encoding="utf-8"?>
@@ -11944,19 +12314,19 @@
 </file>
 
 <file path=customXml/itemProps1.xml><?xml version="1.0" encoding="utf-8"?>
-<ds:datastoreItem xmlns:ds="http://schemas.openxmlformats.org/officeDocument/2006/customXml" ds:itemID="{659927E4-E194-47BE-91C2-B87D50CF51DB}">
+<ds:datastoreItem xmlns:ds="http://schemas.openxmlformats.org/officeDocument/2006/customXml" ds:itemID="{0E92E9E5-79AF-4029-8FCA-9C327D54FD8F}">
   <ds:schemaRefs>
-    <ds:schemaRef ds:uri="http://schemas.microsoft.com/sharepoint/v3/contenttype/forms"/>
+    <ds:schemaRef ds:uri="http://schemas.microsoft.com/office/2006/metadata/properties"/>
+    <ds:schemaRef ds:uri="http://schemas.microsoft.com/office/infopath/2007/PartnerControls"/>
+    <ds:schemaRef ds:uri="71af3243-3dd4-4a8d-8c0d-dd76da1f02a5"/>
   </ds:schemaRefs>
 </ds:datastoreItem>
 </file>
 
 <file path=customXml/itemProps2.xml><?xml version="1.0" encoding="utf-8"?>
-<ds:datastoreItem xmlns:ds="http://schemas.openxmlformats.org/officeDocument/2006/customXml" ds:itemID="{0E92E9E5-79AF-4029-8FCA-9C327D54FD8F}">
+<ds:datastoreItem xmlns:ds="http://schemas.openxmlformats.org/officeDocument/2006/customXml" ds:itemID="{659927E4-E194-47BE-91C2-B87D50CF51DB}">
   <ds:schemaRefs>
-    <ds:schemaRef ds:uri="http://schemas.microsoft.com/office/2006/metadata/properties"/>
-    <ds:schemaRef ds:uri="http://schemas.microsoft.com/office/infopath/2007/PartnerControls"/>
-    <ds:schemaRef ds:uri="71af3243-3dd4-4a8d-8c0d-dd76da1f02a5"/>
+    <ds:schemaRef ds:uri="http://schemas.microsoft.com/sharepoint/v3/contenttype/forms"/>
   </ds:schemaRefs>
 </ds:datastoreItem>
 </file>

</xml_diff>